<commit_message>
Inclusão dos links do github
</commit_message>
<xml_diff>
--- a/Portfolio/Eixo 5 - Portifólio de Projetos.pptx
+++ b/Portfolio/Eixo 5 - Portifólio de Projetos.pptx
@@ -5655,7 +5655,7 @@
                 <a:solidFill>
                   <a:srgbClr val="0D1F2D"/>
                 </a:solidFill>
-                <a:hlinkClick r:id="rId3"/>
+                <a:hlinkClick r:id="rId7"/>
               </a:rPr>
               <a:t>Grupo 1</a:t>
             </a:r>
@@ -5700,7 +5700,7 @@
                 <a:solidFill>
                   <a:srgbClr val="0D1F2D"/>
                 </a:solidFill>
-                <a:hlinkClick r:id="rId4"/>
+                <a:hlinkClick r:id="rId8"/>
               </a:rPr>
               <a:t>Grupo 2</a:t>
             </a:r>
@@ -5745,7 +5745,7 @@
                 <a:solidFill>
                   <a:srgbClr val="0D1F2D"/>
                 </a:solidFill>
-                <a:hlinkClick r:id="rId5"/>
+                <a:hlinkClick r:id="rId9"/>
               </a:rPr>
               <a:t>Grupo 3</a:t>
             </a:r>
@@ -5790,7 +5790,7 @@
                 <a:solidFill>
                   <a:srgbClr val="0D1F2D"/>
                 </a:solidFill>
-                <a:hlinkClick r:id="rId6"/>
+                <a:hlinkClick r:id="rId10"/>
               </a:rPr>
               <a:t>Grupo 4</a:t>
             </a:r>

</xml_diff>